<commit_message>
Updated session 5 content after group feedback session (removed references to the words basic, switched round content, and added link to the themes on the storage account.)
</commit_message>
<xml_diff>
--- a/session5/Session5.pptx
+++ b/session5/Session5.pptx
@@ -12049,7 +12049,7 @@
           <a:p>
             <a:fld id="{4A49430A-AD38-4C65-88E6-CC3345779C8F}" type="datetimeFigureOut">
               <a:rPr lang="en-GB" smtClean="0"/>
-              <a:t>11/08/2019</a:t>
+              <a:t>13/08/2019</a:t>
             </a:fld>
             <a:endParaRPr lang="en-GB"/>
           </a:p>
@@ -17081,7 +17081,7 @@
           <a:p>
             <a:fld id="{4A49430A-AD38-4C65-88E6-CC3345779C8F}" type="datetimeFigureOut">
               <a:rPr lang="en-GB" smtClean="0"/>
-              <a:t>11/08/2019</a:t>
+              <a:t>13/08/2019</a:t>
             </a:fld>
             <a:endParaRPr lang="en-GB"/>
           </a:p>
@@ -18570,7 +18570,7 @@
             </a:pPr>
             <a:r>
               <a:rPr lang="en-GB" dirty="0"/>
-              <a:t>Until now we’ve done basic layout</a:t>
+              <a:t>Until now we’ve done manual CSS layout which is pretty slow &amp; tricky</a:t>
             </a:r>
           </a:p>
           <a:p>

</xml_diff>